<commit_message>
dependencies for usage with pip install -r
</commit_message>
<xml_diff>
--- a/documentation/dt_sikulix_bridge.pptx
+++ b/documentation/dt_sikulix_bridge.pptx
@@ -5047,7 +5047,7 @@
           <a:noFill/>
           <a:extLst>
             <a:ext uri="{909E8E84-426E-40dd-AFC4-6F175D3DCCD1}">
-              <a14:hiddenFill xmlns="" xmlns:a14="http://schemas.microsoft.com/office/drawing/2010/main">
+              <a14:hiddenFill xmlns:a14="http://schemas.microsoft.com/office/drawing/2010/main" xmlns="">
                 <a:solidFill>
                   <a:srgbClr val="FFFFFF"/>
                 </a:solidFill>
@@ -5231,7 +5231,7 @@
           <a:noFill/>
           <a:extLst>
             <a:ext uri="{909E8E84-426E-40dd-AFC4-6F175D3DCCD1}">
-              <a14:hiddenFill xmlns="" xmlns:a14="http://schemas.microsoft.com/office/drawing/2010/main">
+              <a14:hiddenFill xmlns:a14="http://schemas.microsoft.com/office/drawing/2010/main" xmlns="">
                 <a:solidFill>
                   <a:srgbClr val="FFFFFF"/>
                 </a:solidFill>
@@ -5624,7 +5624,7 @@
           <a:noFill/>
           <a:extLst>
             <a:ext uri="{909E8E84-426E-40dd-AFC4-6F175D3DCCD1}">
-              <a14:hiddenFill xmlns="" xmlns:a14="http://schemas.microsoft.com/office/drawing/2010/main">
+              <a14:hiddenFill xmlns:a14="http://schemas.microsoft.com/office/drawing/2010/main" xmlns="">
                 <a:solidFill>
                   <a:srgbClr val="FFFFFF"/>
                 </a:solidFill>
@@ -6017,7 +6017,7 @@
           <a:noFill/>
           <a:extLst>
             <a:ext uri="{909E8E84-426E-40dd-AFC4-6F175D3DCCD1}">
-              <a14:hiddenFill xmlns="" xmlns:a14="http://schemas.microsoft.com/office/drawing/2010/main">
+              <a14:hiddenFill xmlns:a14="http://schemas.microsoft.com/office/drawing/2010/main" xmlns="">
                 <a:solidFill>
                   <a:srgbClr val="FFFFFF"/>
                 </a:solidFill>
@@ -8230,7 +8230,7 @@
           <a:noFill/>
           <a:extLst>
             <a:ext uri="{909E8E84-426E-40dd-AFC4-6F175D3DCCD1}">
-              <a14:hiddenFill xmlns="" xmlns:a14="http://schemas.microsoft.com/office/drawing/2010/main">
+              <a14:hiddenFill xmlns:a14="http://schemas.microsoft.com/office/drawing/2010/main" xmlns="">
                 <a:solidFill>
                   <a:srgbClr val="FFFFFF"/>
                 </a:solidFill>
@@ -11962,7 +11962,7 @@
           <a:noFill/>
           <a:extLst>
             <a:ext uri="{909E8E84-426E-40dd-AFC4-6F175D3DCCD1}">
-              <a14:hiddenFill xmlns="" xmlns:a14="http://schemas.microsoft.com/office/drawing/2010/main">
+              <a14:hiddenFill xmlns:a14="http://schemas.microsoft.com/office/drawing/2010/main" xmlns="">
                 <a:solidFill>
                   <a:srgbClr val="FFFFFF"/>
                 </a:solidFill>
@@ -12286,7 +12286,7 @@
           <a:noFill/>
           <a:extLst>
             <a:ext uri="{909E8E84-426E-40dd-AFC4-6F175D3DCCD1}">
-              <a14:hiddenFill xmlns="" xmlns:a14="http://schemas.microsoft.com/office/drawing/2010/main">
+              <a14:hiddenFill xmlns:a14="http://schemas.microsoft.com/office/drawing/2010/main" xmlns="">
                 <a:solidFill>
                   <a:srgbClr val="FFFFFF"/>
                 </a:solidFill>
@@ -12679,7 +12679,7 @@
           <a:noFill/>
           <a:extLst>
             <a:ext uri="{909E8E84-426E-40dd-AFC4-6F175D3DCCD1}">
-              <a14:hiddenFill xmlns="" xmlns:a14="http://schemas.microsoft.com/office/drawing/2010/main">
+              <a14:hiddenFill xmlns:a14="http://schemas.microsoft.com/office/drawing/2010/main" xmlns="">
                 <a:solidFill>
                   <a:srgbClr val="FFFFFF"/>
                 </a:solidFill>
@@ -13072,7 +13072,7 @@
           <a:noFill/>
           <a:extLst>
             <a:ext uri="{909E8E84-426E-40dd-AFC4-6F175D3DCCD1}">
-              <a14:hiddenFill xmlns="" xmlns:a14="http://schemas.microsoft.com/office/drawing/2010/main">
+              <a14:hiddenFill xmlns:a14="http://schemas.microsoft.com/office/drawing/2010/main" xmlns="">
                 <a:solidFill>
                   <a:srgbClr val="FFFFFF"/>
                 </a:solidFill>
@@ -14578,7 +14578,7 @@
           <a:noFill/>
           <a:extLst>
             <a:ext uri="{909E8E84-426E-40dd-AFC4-6F175D3DCCD1}">
-              <a14:hiddenFill xmlns="" xmlns:a14="http://schemas.microsoft.com/office/drawing/2010/main">
+              <a14:hiddenFill xmlns:a14="http://schemas.microsoft.com/office/drawing/2010/main" xmlns="">
                 <a:solidFill>
                   <a:srgbClr val="FFFFFF"/>
                 </a:solidFill>
@@ -15121,7 +15121,7 @@
           <a:noFill/>
           <a:extLst>
             <a:ext uri="{909E8E84-426E-40dd-AFC4-6F175D3DCCD1}">
-              <a14:hiddenFill xmlns="" xmlns:a14="http://schemas.microsoft.com/office/drawing/2010/main">
+              <a14:hiddenFill xmlns:a14="http://schemas.microsoft.com/office/drawing/2010/main" xmlns="">
                 <a:solidFill>
                   <a:srgbClr val="FFFFFF"/>
                 </a:solidFill>
@@ -15444,7 +15444,7 @@
           <a:noFill/>
           <a:extLst>
             <a:ext uri="{909E8E84-426E-40dd-AFC4-6F175D3DCCD1}">
-              <a14:hiddenFill xmlns="" xmlns:a14="http://schemas.microsoft.com/office/drawing/2010/main">
+              <a14:hiddenFill xmlns:a14="http://schemas.microsoft.com/office/drawing/2010/main" xmlns="">
                 <a:solidFill>
                   <a:srgbClr val="FFFFFF"/>
                 </a:solidFill>
@@ -15837,7 +15837,7 @@
           <a:noFill/>
           <a:extLst>
             <a:ext uri="{909E8E84-426E-40dd-AFC4-6F175D3DCCD1}">
-              <a14:hiddenFill xmlns="" xmlns:a14="http://schemas.microsoft.com/office/drawing/2010/main">
+              <a14:hiddenFill xmlns:a14="http://schemas.microsoft.com/office/drawing/2010/main" xmlns="">
                 <a:solidFill>
                   <a:srgbClr val="FFFFFF"/>
                 </a:solidFill>
@@ -16230,7 +16230,7 @@
           <a:noFill/>
           <a:extLst>
             <a:ext uri="{909E8E84-426E-40dd-AFC4-6F175D3DCCD1}">
-              <a14:hiddenFill xmlns="" xmlns:a14="http://schemas.microsoft.com/office/drawing/2010/main">
+              <a14:hiddenFill xmlns:a14="http://schemas.microsoft.com/office/drawing/2010/main" xmlns="">
                 <a:solidFill>
                   <a:srgbClr val="FFFFFF"/>
                 </a:solidFill>
@@ -17637,8 +17637,8 @@
         </p:nvSpPr>
         <p:spPr>
           <a:xfrm>
-            <a:off x="4629997" y="5772780"/>
-            <a:ext cx="3183477" cy="646331"/>
+            <a:off x="3744188" y="6040095"/>
+            <a:ext cx="8313026" cy="646331"/>
           </a:xfrm>
           <a:prstGeom prst="rect">
             <a:avLst/>
@@ -17709,6 +17709,69 @@
               <a:rPr lang="fr-FR" dirty="0"/>
               <a:t> the Web UI</a:t>
             </a:r>
+          </a:p>
+          <a:p>
+            <a:pPr algn="ctr"/>
+            <a:r>
+              <a:rPr lang="fr-FR" dirty="0"/>
+              <a:t>Note: Can </a:t>
+            </a:r>
+            <a:r>
+              <a:rPr lang="fr-FR" dirty="0" err="1"/>
+              <a:t>be</a:t>
+            </a:r>
+            <a:r>
+              <a:rPr lang="fr-FR" dirty="0"/>
+              <a:t> </a:t>
+            </a:r>
+            <a:r>
+              <a:rPr lang="fr-FR" dirty="0" err="1"/>
+              <a:t>used</a:t>
+            </a:r>
+            <a:r>
+              <a:rPr lang="fr-FR" dirty="0"/>
+              <a:t> </a:t>
+            </a:r>
+            <a:r>
+              <a:rPr lang="fr-FR" dirty="0" err="1"/>
+              <a:t>also</a:t>
+            </a:r>
+            <a:r>
+              <a:rPr lang="fr-FR" dirty="0"/>
+              <a:t> to </a:t>
+            </a:r>
+            <a:r>
+              <a:rPr lang="fr-FR" dirty="0" err="1"/>
+              <a:t>upload</a:t>
+            </a:r>
+            <a:r>
+              <a:rPr lang="fr-FR" dirty="0"/>
+              <a:t> </a:t>
+            </a:r>
+            <a:r>
+              <a:rPr lang="fr-FR" dirty="0" err="1"/>
+              <a:t>compiled</a:t>
+            </a:r>
+            <a:r>
+              <a:rPr lang="fr-FR" dirty="0"/>
+              <a:t> </a:t>
+            </a:r>
+            <a:r>
+              <a:rPr lang="fr-FR" dirty="0" err="1"/>
+              <a:t>SikuliX</a:t>
+            </a:r>
+            <a:r>
+              <a:rPr lang="fr-FR" dirty="0"/>
+              <a:t> scripts to the bridge for </a:t>
+            </a:r>
+            <a:r>
+              <a:rPr lang="fr-FR" dirty="0" err="1"/>
+              <a:t>execution</a:t>
+            </a:r>
+            <a:r>
+              <a:rPr lang="fr-FR" dirty="0"/>
+              <a:t>…</a:t>
+            </a:r>
             <a:endParaRPr lang="en-US" dirty="0"/>
           </a:p>
         </p:txBody>
@@ -17751,7 +17814,7 @@
           <a:noFill/>
           <a:extLst>
             <a:ext uri="{909E8E84-426E-40dd-AFC4-6F175D3DCCD1}">
-              <a14:hiddenFill xmlns="" xmlns:a14="http://schemas.microsoft.com/office/drawing/2010/main">
+              <a14:hiddenFill xmlns:a14="http://schemas.microsoft.com/office/drawing/2010/main" xmlns="">
                 <a:solidFill>
                   <a:srgbClr val="FFFFFF"/>
                 </a:solidFill>
@@ -19444,7 +19507,7 @@
           <a:noFill/>
           <a:extLst>
             <a:ext uri="{909E8E84-426E-40dd-AFC4-6F175D3DCCD1}">
-              <a14:hiddenFill xmlns:a14="http://schemas.microsoft.com/office/drawing/2010/main" xmlns="">
+              <a14:hiddenFill xmlns="" xmlns:a14="http://schemas.microsoft.com/office/drawing/2010/main">
                 <a:solidFill>
                   <a:srgbClr val="FFFFFF"/>
                 </a:solidFill>
@@ -19832,7 +19895,7 @@
           <a:noFill/>
           <a:extLst>
             <a:ext uri="{909E8E84-426E-40dd-AFC4-6F175D3DCCD1}">
-              <a14:hiddenFill xmlns:a14="http://schemas.microsoft.com/office/drawing/2010/main" xmlns="">
+              <a14:hiddenFill xmlns="" xmlns:a14="http://schemas.microsoft.com/office/drawing/2010/main">
                 <a:solidFill>
                   <a:srgbClr val="FFFFFF"/>
                 </a:solidFill>
@@ -20508,7 +20571,7 @@
           <a:noFill/>
           <a:extLst>
             <a:ext uri="{909E8E84-426E-40dd-AFC4-6F175D3DCCD1}">
-              <a14:hiddenFill xmlns:a14="http://schemas.microsoft.com/office/drawing/2010/main" xmlns="">
+              <a14:hiddenFill xmlns="" xmlns:a14="http://schemas.microsoft.com/office/drawing/2010/main">
                 <a:solidFill>
                   <a:srgbClr val="FFFFFF"/>
                 </a:solidFill>
@@ -20901,7 +20964,7 @@
           <a:noFill/>
           <a:extLst>
             <a:ext uri="{909E8E84-426E-40dd-AFC4-6F175D3DCCD1}">
-              <a14:hiddenFill xmlns:a14="http://schemas.microsoft.com/office/drawing/2010/main" xmlns="">
+              <a14:hiddenFill xmlns="" xmlns:a14="http://schemas.microsoft.com/office/drawing/2010/main">
                 <a:solidFill>
                   <a:srgbClr val="FFFFFF"/>
                 </a:solidFill>

</xml_diff>